<commit_message>
fixed spelling mistake in step 2
</commit_message>
<xml_diff>
--- a/resources/futures_animation.pptx
+++ b/resources/futures_animation.pptx
@@ -20719,23 +20719,23 @@
           </p:cNvPr>
           <p:cNvCxnSpPr>
             <a:cxnSpLocks/>
-            <a:endCxn id="11" idx="3"/>
           </p:cNvCxnSpPr>
           <p:nvPr/>
         </p:nvCxnSpPr>
         <p:spPr>
-          <a:xfrm rot="5400000">
-            <a:off x="4852433" y="1081633"/>
-            <a:ext cx="4023326" cy="2840737"/>
+          <a:xfrm flipH="1">
+            <a:off x="8321692" y="507100"/>
+            <a:ext cx="12700" cy="1881008"/>
           </a:xfrm>
-          <a:prstGeom prst="bentConnector2">
+          <a:prstGeom prst="straightConnector1">
             <a:avLst/>
           </a:prstGeom>
           <a:ln w="38100">
             <a:solidFill>
               <a:srgbClr val="FF0000"/>
             </a:solidFill>
-            <a:tailEnd type="triangle"/>
+            <a:headEnd type="none" w="med" len="med"/>
+            <a:tailEnd type="oval" w="med" len="med"/>
           </a:ln>
         </p:spPr>
         <p:style>
@@ -20755,10 +20755,10 @@
       </p:cxnSp>
       <p:sp>
         <p:nvSpPr>
-          <p:cNvPr id="21" name="Snakkeboble: rektangel 20">
-            <a:extLst>
-              <a:ext uri="{FF2B5EF4-FFF2-40B4-BE49-F238E27FC236}">
-                <a16:creationId xmlns:a16="http://schemas.microsoft.com/office/drawing/2014/main" id="{694E7474-3472-49EC-82D6-8823B7850FBE}"/>
+          <p:cNvPr id="20" name="Snakkeboble: rektangel 20">
+            <a:extLst>
+              <a:ext uri="{FF2B5EF4-FFF2-40B4-BE49-F238E27FC236}">
+                <a16:creationId xmlns:a16="http://schemas.microsoft.com/office/drawing/2014/main" id="{4C958EA1-FB7B-4A78-9B9B-7BF6B50DC4F1}"/>
               </a:ext>
             </a:extLst>
           </p:cNvPr>
@@ -20767,8 +20767,8 @@
         </p:nvSpPr>
         <p:spPr>
           <a:xfrm>
-            <a:off x="5340095" y="2723227"/>
-            <a:ext cx="2743200" cy="1316736"/>
+            <a:off x="6053252" y="1358552"/>
+            <a:ext cx="2054352" cy="3176872"/>
           </a:xfrm>
           <a:prstGeom prst="wedgeRectCallout">
             <a:avLst>
@@ -20853,6 +20853,42 @@
                 </a:solidFill>
                 <a:latin typeface="Agave" panose="020B0509040604020203" pitchFamily="49" charset="0"/>
               </a:rPr>
+              <a:t> in to </a:t>
+            </a:r>
+            <a:r>
+              <a:rPr lang="nb-NO" sz="1200" dirty="0" err="1">
+                <a:solidFill>
+                  <a:schemeClr val="tx1"/>
+                </a:solidFill>
+                <a:latin typeface="Agave" panose="020B0509040604020203" pitchFamily="49" charset="0"/>
+              </a:rPr>
+              <a:t>Future</a:t>
+            </a:r>
+            <a:r>
+              <a:rPr lang="nb-NO" sz="1200" dirty="0">
+                <a:solidFill>
+                  <a:schemeClr val="tx1"/>
+                </a:solidFill>
+                <a:latin typeface="Agave" panose="020B0509040604020203" pitchFamily="49" charset="0"/>
+              </a:rPr>
+              <a:t>::poll </a:t>
+            </a:r>
+            <a:r>
+              <a:rPr lang="nb-NO" sz="1200" dirty="0" err="1">
+                <a:solidFill>
+                  <a:schemeClr val="tx1"/>
+                </a:solidFill>
+                <a:latin typeface="Agave" panose="020B0509040604020203" pitchFamily="49" charset="0"/>
+              </a:rPr>
+              <a:t>but</a:t>
+            </a:r>
+            <a:r>
+              <a:rPr lang="nb-NO" sz="1200" dirty="0">
+                <a:solidFill>
+                  <a:schemeClr val="tx1"/>
+                </a:solidFill>
+                <a:latin typeface="Agave" panose="020B0509040604020203" pitchFamily="49" charset="0"/>
+              </a:rPr>
               <a:t> </a:t>
             </a:r>
             <a:r>
@@ -20862,6 +20898,114 @@
                 </a:solidFill>
                 <a:latin typeface="Agave" panose="020B0509040604020203" pitchFamily="49" charset="0"/>
               </a:rPr>
+              <a:t>since</a:t>
+            </a:r>
+            <a:r>
+              <a:rPr lang="nb-NO" sz="1200" dirty="0">
+                <a:solidFill>
+                  <a:schemeClr val="tx1"/>
+                </a:solidFill>
+                <a:latin typeface="Agave" panose="020B0509040604020203" pitchFamily="49" charset="0"/>
+              </a:rPr>
+              <a:t> </a:t>
+            </a:r>
+            <a:r>
+              <a:rPr lang="nb-NO" sz="1200" dirty="0" err="1">
+                <a:solidFill>
+                  <a:schemeClr val="tx1"/>
+                </a:solidFill>
+                <a:latin typeface="Agave" panose="020B0509040604020203" pitchFamily="49" charset="0"/>
+              </a:rPr>
+              <a:t>this</a:t>
+            </a:r>
+            <a:r>
+              <a:rPr lang="nb-NO" sz="1200" dirty="0">
+                <a:solidFill>
+                  <a:schemeClr val="tx1"/>
+                </a:solidFill>
+                <a:latin typeface="Agave" panose="020B0509040604020203" pitchFamily="49" charset="0"/>
+              </a:rPr>
+              <a:t> is a non-</a:t>
+            </a:r>
+            <a:r>
+              <a:rPr lang="nb-NO" sz="1200" dirty="0" err="1">
+                <a:solidFill>
+                  <a:schemeClr val="tx1"/>
+                </a:solidFill>
+                <a:latin typeface="Agave" panose="020B0509040604020203" pitchFamily="49" charset="0"/>
+              </a:rPr>
+              <a:t>leaf</a:t>
+            </a:r>
+            <a:r>
+              <a:rPr lang="nb-NO" sz="1200" dirty="0">
+                <a:solidFill>
+                  <a:schemeClr val="tx1"/>
+                </a:solidFill>
+                <a:latin typeface="Agave" panose="020B0509040604020203" pitchFamily="49" charset="0"/>
+              </a:rPr>
+              <a:t> </a:t>
+            </a:r>
+            <a:r>
+              <a:rPr lang="nb-NO" sz="1200" dirty="0" err="1">
+                <a:solidFill>
+                  <a:schemeClr val="tx1"/>
+                </a:solidFill>
+                <a:latin typeface="Agave" panose="020B0509040604020203" pitchFamily="49" charset="0"/>
+              </a:rPr>
+              <a:t>future</a:t>
+            </a:r>
+            <a:r>
+              <a:rPr lang="nb-NO" sz="1200" dirty="0">
+                <a:solidFill>
+                  <a:schemeClr val="tx1"/>
+                </a:solidFill>
+                <a:latin typeface="Agave" panose="020B0509040604020203" pitchFamily="49" charset="0"/>
+              </a:rPr>
+              <a:t> it </a:t>
+            </a:r>
+            <a:r>
+              <a:rPr lang="nb-NO" sz="1200" dirty="0" err="1">
+                <a:solidFill>
+                  <a:schemeClr val="tx1"/>
+                </a:solidFill>
+                <a:latin typeface="Agave" panose="020B0509040604020203" pitchFamily="49" charset="0"/>
+              </a:rPr>
+              <a:t>won’t</a:t>
+            </a:r>
+            <a:r>
+              <a:rPr lang="nb-NO" sz="1200" dirty="0">
+                <a:solidFill>
+                  <a:schemeClr val="tx1"/>
+                </a:solidFill>
+                <a:latin typeface="Agave" panose="020B0509040604020203" pitchFamily="49" charset="0"/>
+              </a:rPr>
+              <a:t> </a:t>
+            </a:r>
+            <a:r>
+              <a:rPr lang="nb-NO" sz="1200" dirty="0" err="1">
+                <a:solidFill>
+                  <a:schemeClr val="tx1"/>
+                </a:solidFill>
+                <a:latin typeface="Agave" panose="020B0509040604020203" pitchFamily="49" charset="0"/>
+              </a:rPr>
+              <a:t>block</a:t>
+            </a:r>
+            <a:r>
+              <a:rPr lang="nb-NO" sz="1200" dirty="0">
+                <a:solidFill>
+                  <a:schemeClr val="tx1"/>
+                </a:solidFill>
+                <a:latin typeface="Agave" panose="020B0509040604020203" pitchFamily="49" charset="0"/>
+              </a:rPr>
+              <a:t> </a:t>
+            </a:r>
+            <a:r>
+              <a:rPr lang="nb-NO" sz="1200" dirty="0" err="1">
+                <a:solidFill>
+                  <a:schemeClr val="tx1"/>
+                </a:solidFill>
+                <a:latin typeface="Agave" panose="020B0509040604020203" pitchFamily="49" charset="0"/>
+              </a:rPr>
               <a:t>on</a:t>
             </a:r>
             <a:r>
@@ -20871,6 +21015,448 @@
                 </a:solidFill>
                 <a:latin typeface="Agave" panose="020B0509040604020203" pitchFamily="49" charset="0"/>
               </a:rPr>
+              <a:t> I/O so </a:t>
+            </a:r>
+            <a:r>
+              <a:rPr lang="nb-NO" sz="1200" dirty="0" err="1">
+                <a:solidFill>
+                  <a:schemeClr val="tx1"/>
+                </a:solidFill>
+                <a:latin typeface="Agave" panose="020B0509040604020203" pitchFamily="49" charset="0"/>
+              </a:rPr>
+              <a:t>we</a:t>
+            </a:r>
+            <a:r>
+              <a:rPr lang="nb-NO" sz="1200" dirty="0">
+                <a:solidFill>
+                  <a:schemeClr val="tx1"/>
+                </a:solidFill>
+                <a:latin typeface="Agave" panose="020B0509040604020203" pitchFamily="49" charset="0"/>
+              </a:rPr>
+              <a:t> </a:t>
+            </a:r>
+            <a:r>
+              <a:rPr lang="nb-NO" sz="1200" dirty="0" err="1">
+                <a:solidFill>
+                  <a:schemeClr val="tx1"/>
+                </a:solidFill>
+                <a:latin typeface="Agave" panose="020B0509040604020203" pitchFamily="49" charset="0"/>
+              </a:rPr>
+              <a:t>don’t</a:t>
+            </a:r>
+            <a:r>
+              <a:rPr lang="nb-NO" sz="1200" dirty="0">
+                <a:solidFill>
+                  <a:schemeClr val="tx1"/>
+                </a:solidFill>
+                <a:latin typeface="Agave" panose="020B0509040604020203" pitchFamily="49" charset="0"/>
+              </a:rPr>
+              <a:t> </a:t>
+            </a:r>
+            <a:r>
+              <a:rPr lang="nb-NO" sz="1200" dirty="0" err="1">
+                <a:solidFill>
+                  <a:schemeClr val="tx1"/>
+                </a:solidFill>
+                <a:latin typeface="Agave" panose="020B0509040604020203" pitchFamily="49" charset="0"/>
+              </a:rPr>
+              <a:t>really</a:t>
+            </a:r>
+            <a:r>
+              <a:rPr lang="nb-NO" sz="1200" dirty="0">
+                <a:solidFill>
+                  <a:schemeClr val="tx1"/>
+                </a:solidFill>
+                <a:latin typeface="Agave" panose="020B0509040604020203" pitchFamily="49" charset="0"/>
+              </a:rPr>
+              <a:t> </a:t>
+            </a:r>
+            <a:r>
+              <a:rPr lang="nb-NO" sz="1200" dirty="0" err="1">
+                <a:solidFill>
+                  <a:schemeClr val="tx1"/>
+                </a:solidFill>
+                <a:latin typeface="Agave" panose="020B0509040604020203" pitchFamily="49" charset="0"/>
+              </a:rPr>
+              <a:t>need</a:t>
+            </a:r>
+            <a:r>
+              <a:rPr lang="nb-NO" sz="1200" dirty="0">
+                <a:solidFill>
+                  <a:schemeClr val="tx1"/>
+                </a:solidFill>
+                <a:latin typeface="Agave" panose="020B0509040604020203" pitchFamily="49" charset="0"/>
+              </a:rPr>
+              <a:t> it. </a:t>
+            </a:r>
+          </a:p>
+          <a:p>
+            <a:endParaRPr lang="nb-NO" sz="1200" dirty="0">
+              <a:solidFill>
+                <a:schemeClr val="tx1"/>
+              </a:solidFill>
+              <a:latin typeface="Agave" panose="020B0509040604020203" pitchFamily="49" charset="0"/>
+            </a:endParaRPr>
+          </a:p>
+          <a:p>
+            <a:r>
+              <a:rPr lang="nb-NO" sz="1200" dirty="0" err="1">
+                <a:solidFill>
+                  <a:schemeClr val="tx1"/>
+                </a:solidFill>
+                <a:latin typeface="Agave" panose="020B0509040604020203" pitchFamily="49" charset="0"/>
+              </a:rPr>
+              <a:t>Also</a:t>
+            </a:r>
+            <a:r>
+              <a:rPr lang="nb-NO" sz="1200" dirty="0">
+                <a:solidFill>
+                  <a:schemeClr val="tx1"/>
+                </a:solidFill>
+                <a:latin typeface="Agave" panose="020B0509040604020203" pitchFamily="49" charset="0"/>
+              </a:rPr>
+              <a:t>, </a:t>
+            </a:r>
+            <a:r>
+              <a:rPr lang="nb-NO" sz="1200" dirty="0" err="1">
+                <a:solidFill>
+                  <a:schemeClr val="tx1"/>
+                </a:solidFill>
+                <a:latin typeface="Agave" panose="020B0509040604020203" pitchFamily="49" charset="0"/>
+              </a:rPr>
+              <a:t>we</a:t>
+            </a:r>
+            <a:r>
+              <a:rPr lang="nb-NO" sz="1200" dirty="0">
+                <a:solidFill>
+                  <a:schemeClr val="tx1"/>
+                </a:solidFill>
+                <a:latin typeface="Agave" panose="020B0509040604020203" pitchFamily="49" charset="0"/>
+              </a:rPr>
+              <a:t> </a:t>
+            </a:r>
+            <a:r>
+              <a:rPr lang="nb-NO" sz="1200" dirty="0" err="1">
+                <a:solidFill>
+                  <a:schemeClr val="tx1"/>
+                </a:solidFill>
+                <a:latin typeface="Agave" panose="020B0509040604020203" pitchFamily="49" charset="0"/>
+              </a:rPr>
+              <a:t>don’t</a:t>
+            </a:r>
+            <a:r>
+              <a:rPr lang="nb-NO" sz="1200" dirty="0">
+                <a:solidFill>
+                  <a:schemeClr val="tx1"/>
+                </a:solidFill>
+                <a:latin typeface="Agave" panose="020B0509040604020203" pitchFamily="49" charset="0"/>
+              </a:rPr>
+              <a:t> </a:t>
+            </a:r>
+            <a:r>
+              <a:rPr lang="nb-NO" sz="1200" dirty="0" err="1">
+                <a:solidFill>
+                  <a:schemeClr val="tx1"/>
+                </a:solidFill>
+                <a:latin typeface="Agave" panose="020B0509040604020203" pitchFamily="49" charset="0"/>
+              </a:rPr>
+              <a:t>actually</a:t>
+            </a:r>
+            <a:r>
+              <a:rPr lang="nb-NO" sz="1200" dirty="0">
+                <a:solidFill>
+                  <a:schemeClr val="tx1"/>
+                </a:solidFill>
+                <a:latin typeface="Agave" panose="020B0509040604020203" pitchFamily="49" charset="0"/>
+              </a:rPr>
+              <a:t> pass a `</a:t>
+            </a:r>
+            <a:r>
+              <a:rPr lang="nb-NO" sz="1200" dirty="0" err="1">
+                <a:solidFill>
+                  <a:schemeClr val="tx1"/>
+                </a:solidFill>
+                <a:latin typeface="Agave" panose="020B0509040604020203" pitchFamily="49" charset="0"/>
+              </a:rPr>
+              <a:t>Waker</a:t>
+            </a:r>
+            <a:r>
+              <a:rPr lang="nb-NO" sz="1200" dirty="0">
+                <a:solidFill>
+                  <a:schemeClr val="tx1"/>
+                </a:solidFill>
+                <a:latin typeface="Agave" panose="020B0509040604020203" pitchFamily="49" charset="0"/>
+              </a:rPr>
+              <a:t>` </a:t>
+            </a:r>
+            <a:r>
+              <a:rPr lang="nb-NO" sz="1200" dirty="0" err="1">
+                <a:solidFill>
+                  <a:schemeClr val="tx1"/>
+                </a:solidFill>
+                <a:latin typeface="Agave" panose="020B0509040604020203" pitchFamily="49" charset="0"/>
+              </a:rPr>
+              <a:t>directly</a:t>
+            </a:r>
+            <a:r>
+              <a:rPr lang="nb-NO" sz="1200" dirty="0">
+                <a:solidFill>
+                  <a:schemeClr val="tx1"/>
+                </a:solidFill>
+                <a:latin typeface="Agave" panose="020B0509040604020203" pitchFamily="49" charset="0"/>
+              </a:rPr>
+              <a:t>. </a:t>
+            </a:r>
+            <a:r>
+              <a:rPr lang="nb-NO" sz="1200" dirty="0" err="1">
+                <a:solidFill>
+                  <a:schemeClr val="tx1"/>
+                </a:solidFill>
+                <a:latin typeface="Agave" panose="020B0509040604020203" pitchFamily="49" charset="0"/>
+              </a:rPr>
+              <a:t>We</a:t>
+            </a:r>
+            <a:r>
+              <a:rPr lang="nb-NO" sz="1200" dirty="0">
+                <a:solidFill>
+                  <a:schemeClr val="tx1"/>
+                </a:solidFill>
+                <a:latin typeface="Agave" panose="020B0509040604020203" pitchFamily="49" charset="0"/>
+              </a:rPr>
+              <a:t> pass </a:t>
+            </a:r>
+            <a:r>
+              <a:rPr lang="nb-NO" sz="1200" dirty="0" err="1">
+                <a:solidFill>
+                  <a:schemeClr val="tx1"/>
+                </a:solidFill>
+                <a:latin typeface="Agave" panose="020B0509040604020203" pitchFamily="49" charset="0"/>
+              </a:rPr>
+              <a:t>the</a:t>
+            </a:r>
+            <a:r>
+              <a:rPr lang="nb-NO" sz="1200" dirty="0">
+                <a:solidFill>
+                  <a:schemeClr val="tx1"/>
+                </a:solidFill>
+                <a:latin typeface="Agave" panose="020B0509040604020203" pitchFamily="49" charset="0"/>
+              </a:rPr>
+              <a:t> `</a:t>
+            </a:r>
+            <a:r>
+              <a:rPr lang="nb-NO" sz="1200" dirty="0" err="1">
+                <a:solidFill>
+                  <a:schemeClr val="tx1"/>
+                </a:solidFill>
+                <a:latin typeface="Agave" panose="020B0509040604020203" pitchFamily="49" charset="0"/>
+              </a:rPr>
+              <a:t>Waker</a:t>
+            </a:r>
+            <a:r>
+              <a:rPr lang="nb-NO" sz="1200" dirty="0">
+                <a:solidFill>
+                  <a:schemeClr val="tx1"/>
+                </a:solidFill>
+                <a:latin typeface="Agave" panose="020B0509040604020203" pitchFamily="49" charset="0"/>
+              </a:rPr>
+              <a:t>` as a part </a:t>
+            </a:r>
+            <a:r>
+              <a:rPr lang="nb-NO" sz="1200" dirty="0" err="1">
+                <a:solidFill>
+                  <a:schemeClr val="tx1"/>
+                </a:solidFill>
+                <a:latin typeface="Agave" panose="020B0509040604020203" pitchFamily="49" charset="0"/>
+              </a:rPr>
+              <a:t>of</a:t>
+            </a:r>
+            <a:r>
+              <a:rPr lang="nb-NO" sz="1200" dirty="0">
+                <a:solidFill>
+                  <a:schemeClr val="tx1"/>
+                </a:solidFill>
+                <a:latin typeface="Agave" panose="020B0509040604020203" pitchFamily="49" charset="0"/>
+              </a:rPr>
+              <a:t> an </a:t>
+            </a:r>
+            <a:r>
+              <a:rPr lang="nb-NO" sz="1200" dirty="0" err="1">
+                <a:solidFill>
+                  <a:schemeClr val="tx1"/>
+                </a:solidFill>
+                <a:latin typeface="Agave" panose="020B0509040604020203" pitchFamily="49" charset="0"/>
+              </a:rPr>
+              <a:t>object</a:t>
+            </a:r>
+            <a:r>
+              <a:rPr lang="nb-NO" sz="1200" dirty="0">
+                <a:solidFill>
+                  <a:schemeClr val="tx1"/>
+                </a:solidFill>
+                <a:latin typeface="Agave" panose="020B0509040604020203" pitchFamily="49" charset="0"/>
+              </a:rPr>
+              <a:t> </a:t>
+            </a:r>
+            <a:r>
+              <a:rPr lang="nb-NO" sz="1200" dirty="0" err="1">
+                <a:solidFill>
+                  <a:schemeClr val="tx1"/>
+                </a:solidFill>
+                <a:latin typeface="Agave" panose="020B0509040604020203" pitchFamily="49" charset="0"/>
+              </a:rPr>
+              <a:t>called</a:t>
+            </a:r>
+            <a:r>
+              <a:rPr lang="nb-NO" sz="1200" dirty="0">
+                <a:solidFill>
+                  <a:schemeClr val="tx1"/>
+                </a:solidFill>
+                <a:latin typeface="Agave" panose="020B0509040604020203" pitchFamily="49" charset="0"/>
+              </a:rPr>
+              <a:t> `</a:t>
+            </a:r>
+            <a:r>
+              <a:rPr lang="nb-NO" sz="1200" dirty="0" err="1">
+                <a:solidFill>
+                  <a:schemeClr val="tx1"/>
+                </a:solidFill>
+                <a:latin typeface="Agave" panose="020B0509040604020203" pitchFamily="49" charset="0"/>
+              </a:rPr>
+              <a:t>Context</a:t>
+            </a:r>
+            <a:r>
+              <a:rPr lang="nb-NO" sz="1200" dirty="0">
+                <a:solidFill>
+                  <a:schemeClr val="tx1"/>
+                </a:solidFill>
+                <a:latin typeface="Agave" panose="020B0509040604020203" pitchFamily="49" charset="0"/>
+              </a:rPr>
+              <a:t>` </a:t>
+            </a:r>
+            <a:r>
+              <a:rPr lang="nb-NO" sz="1200" dirty="0" err="1">
+                <a:solidFill>
+                  <a:schemeClr val="tx1"/>
+                </a:solidFill>
+                <a:latin typeface="Agave" panose="020B0509040604020203" pitchFamily="49" charset="0"/>
+              </a:rPr>
+              <a:t>which</a:t>
+            </a:r>
+            <a:r>
+              <a:rPr lang="nb-NO" sz="1200" dirty="0">
+                <a:solidFill>
+                  <a:schemeClr val="tx1"/>
+                </a:solidFill>
+                <a:latin typeface="Agave" panose="020B0509040604020203" pitchFamily="49" charset="0"/>
+              </a:rPr>
+              <a:t> </a:t>
+            </a:r>
+            <a:r>
+              <a:rPr lang="nb-NO" sz="1200" dirty="0" err="1">
+                <a:solidFill>
+                  <a:schemeClr val="tx1"/>
+                </a:solidFill>
+                <a:latin typeface="Agave" panose="020B0509040604020203" pitchFamily="49" charset="0"/>
+              </a:rPr>
+              <a:t>might</a:t>
+            </a:r>
+            <a:r>
+              <a:rPr lang="nb-NO" sz="1200" dirty="0">
+                <a:solidFill>
+                  <a:schemeClr val="tx1"/>
+                </a:solidFill>
+                <a:latin typeface="Agave" panose="020B0509040604020203" pitchFamily="49" charset="0"/>
+              </a:rPr>
+              <a:t> in </a:t>
+            </a:r>
+            <a:r>
+              <a:rPr lang="nb-NO" sz="1200" dirty="0" err="1">
+                <a:solidFill>
+                  <a:schemeClr val="tx1"/>
+                </a:solidFill>
+                <a:latin typeface="Agave" panose="020B0509040604020203" pitchFamily="49" charset="0"/>
+              </a:rPr>
+              <a:t>the</a:t>
+            </a:r>
+            <a:r>
+              <a:rPr lang="nb-NO" sz="1200" dirty="0">
+                <a:solidFill>
+                  <a:schemeClr val="tx1"/>
+                </a:solidFill>
+                <a:latin typeface="Agave" panose="020B0509040604020203" pitchFamily="49" charset="0"/>
+              </a:rPr>
+              <a:t> </a:t>
+            </a:r>
+            <a:r>
+              <a:rPr lang="nb-NO" sz="1200" dirty="0" err="1">
+                <a:solidFill>
+                  <a:schemeClr val="tx1"/>
+                </a:solidFill>
+                <a:latin typeface="Agave" panose="020B0509040604020203" pitchFamily="49" charset="0"/>
+              </a:rPr>
+              <a:t>future</a:t>
+            </a:r>
+            <a:r>
+              <a:rPr lang="nb-NO" sz="1200" dirty="0">
+                <a:solidFill>
+                  <a:schemeClr val="tx1"/>
+                </a:solidFill>
+                <a:latin typeface="Agave" panose="020B0509040604020203" pitchFamily="49" charset="0"/>
+              </a:rPr>
+              <a:t> </a:t>
+            </a:r>
+            <a:r>
+              <a:rPr lang="nb-NO" sz="1200" dirty="0" err="1">
+                <a:solidFill>
+                  <a:schemeClr val="tx1"/>
+                </a:solidFill>
+                <a:latin typeface="Agave" panose="020B0509040604020203" pitchFamily="49" charset="0"/>
+              </a:rPr>
+              <a:t>add</a:t>
+            </a:r>
+            <a:r>
+              <a:rPr lang="nb-NO" sz="1200" dirty="0">
+                <a:solidFill>
+                  <a:schemeClr val="tx1"/>
+                </a:solidFill>
+                <a:latin typeface="Agave" panose="020B0509040604020203" pitchFamily="49" charset="0"/>
+              </a:rPr>
+              <a:t> </a:t>
+            </a:r>
+            <a:r>
+              <a:rPr lang="nb-NO" sz="1200" dirty="0" err="1">
+                <a:solidFill>
+                  <a:schemeClr val="tx1"/>
+                </a:solidFill>
+                <a:latin typeface="Agave" panose="020B0509040604020203" pitchFamily="49" charset="0"/>
+              </a:rPr>
+              <a:t>extra</a:t>
+            </a:r>
+            <a:r>
+              <a:rPr lang="nb-NO" sz="1200" dirty="0">
+                <a:solidFill>
+                  <a:schemeClr val="tx1"/>
+                </a:solidFill>
+                <a:latin typeface="Agave" panose="020B0509040604020203" pitchFamily="49" charset="0"/>
+              </a:rPr>
+              <a:t> </a:t>
+            </a:r>
+            <a:r>
+              <a:rPr lang="nb-NO" sz="1200" dirty="0" err="1">
+                <a:solidFill>
+                  <a:schemeClr val="tx1"/>
+                </a:solidFill>
+                <a:latin typeface="Agave" panose="020B0509040604020203" pitchFamily="49" charset="0"/>
+              </a:rPr>
+              <a:t>context</a:t>
+            </a:r>
+            <a:r>
+              <a:rPr lang="nb-NO" sz="1200" dirty="0">
+                <a:solidFill>
+                  <a:schemeClr val="tx1"/>
+                </a:solidFill>
+                <a:latin typeface="Agave" panose="020B0509040604020203" pitchFamily="49" charset="0"/>
+              </a:rPr>
               <a:t> to </a:t>
             </a:r>
             <a:r>
@@ -20889,295 +21475,25 @@
                 </a:solidFill>
                 <a:latin typeface="Agave" panose="020B0509040604020203" pitchFamily="49" charset="0"/>
               </a:rPr>
-              <a:t> </a:t>
-            </a:r>
-            <a:r>
-              <a:rPr lang="nb-NO" sz="1200" dirty="0" err="1">
-                <a:solidFill>
-                  <a:schemeClr val="tx1"/>
-                </a:solidFill>
-                <a:latin typeface="Agave" panose="020B0509040604020203" pitchFamily="49" charset="0"/>
-              </a:rPr>
-              <a:t>reactor</a:t>
-            </a:r>
-            <a:r>
-              <a:rPr lang="nb-NO" sz="1200" dirty="0">
-                <a:solidFill>
-                  <a:schemeClr val="tx1"/>
-                </a:solidFill>
-                <a:latin typeface="Agave" panose="020B0509040604020203" pitchFamily="49" charset="0"/>
-              </a:rPr>
-              <a:t> part. The </a:t>
-            </a:r>
-            <a:r>
-              <a:rPr lang="nb-NO" sz="1200" dirty="0" err="1">
-                <a:solidFill>
-                  <a:schemeClr val="tx1"/>
-                </a:solidFill>
-                <a:latin typeface="Agave" panose="020B0509040604020203" pitchFamily="49" charset="0"/>
-              </a:rPr>
-              <a:t>waker</a:t>
-            </a:r>
-            <a:r>
-              <a:rPr lang="nb-NO" sz="1200" dirty="0">
-                <a:solidFill>
-                  <a:schemeClr val="tx1"/>
-                </a:solidFill>
-                <a:latin typeface="Agave" panose="020B0509040604020203" pitchFamily="49" charset="0"/>
-              </a:rPr>
-              <a:t> is </a:t>
-            </a:r>
-            <a:r>
-              <a:rPr lang="nb-NO" sz="1200" dirty="0" err="1">
-                <a:solidFill>
-                  <a:schemeClr val="tx1"/>
-                </a:solidFill>
-                <a:latin typeface="Agave" panose="020B0509040604020203" pitchFamily="49" charset="0"/>
-              </a:rPr>
-              <a:t>spesific</a:t>
-            </a:r>
-            <a:r>
-              <a:rPr lang="nb-NO" sz="1200" dirty="0">
-                <a:solidFill>
-                  <a:schemeClr val="tx1"/>
-                </a:solidFill>
-                <a:latin typeface="Agave" panose="020B0509040604020203" pitchFamily="49" charset="0"/>
-              </a:rPr>
-              <a:t> for </a:t>
-            </a:r>
-            <a:r>
-              <a:rPr lang="nb-NO" sz="1200" dirty="0" err="1">
-                <a:solidFill>
-                  <a:schemeClr val="tx1"/>
-                </a:solidFill>
-                <a:latin typeface="Agave" panose="020B0509040604020203" pitchFamily="49" charset="0"/>
-              </a:rPr>
-              <a:t>the</a:t>
-            </a:r>
-            <a:r>
-              <a:rPr lang="nb-NO" sz="1200" dirty="0">
-                <a:solidFill>
-                  <a:schemeClr val="tx1"/>
-                </a:solidFill>
-                <a:latin typeface="Agave" panose="020B0509040604020203" pitchFamily="49" charset="0"/>
-              </a:rPr>
-              <a:t> </a:t>
-            </a:r>
-            <a:r>
-              <a:rPr lang="nb-NO" sz="1200" dirty="0" err="1">
-                <a:solidFill>
-                  <a:schemeClr val="tx1"/>
-                </a:solidFill>
-                <a:latin typeface="Agave" panose="020B0509040604020203" pitchFamily="49" charset="0"/>
-              </a:rPr>
-              <a:t>Executor</a:t>
-            </a:r>
-            <a:r>
-              <a:rPr lang="nb-NO" sz="1200" dirty="0">
-                <a:solidFill>
-                  <a:schemeClr val="tx1"/>
-                </a:solidFill>
-                <a:latin typeface="Agave" panose="020B0509040604020203" pitchFamily="49" charset="0"/>
-              </a:rPr>
-              <a:t>, </a:t>
-            </a:r>
-            <a:r>
-              <a:rPr lang="nb-NO" sz="1200" dirty="0" err="1">
-                <a:solidFill>
-                  <a:schemeClr val="tx1"/>
-                </a:solidFill>
-                <a:latin typeface="Agave" panose="020B0509040604020203" pitchFamily="49" charset="0"/>
-              </a:rPr>
-              <a:t>but</a:t>
-            </a:r>
-            <a:r>
-              <a:rPr lang="nb-NO" sz="1200" dirty="0">
-                <a:solidFill>
-                  <a:schemeClr val="tx1"/>
-                </a:solidFill>
-                <a:latin typeface="Agave" panose="020B0509040604020203" pitchFamily="49" charset="0"/>
-              </a:rPr>
-              <a:t> </a:t>
-            </a:r>
-            <a:r>
-              <a:rPr lang="nb-NO" sz="1200" dirty="0" err="1">
-                <a:solidFill>
-                  <a:schemeClr val="tx1"/>
-                </a:solidFill>
-                <a:latin typeface="Agave" panose="020B0509040604020203" pitchFamily="49" charset="0"/>
-              </a:rPr>
-              <a:t>the</a:t>
-            </a:r>
-            <a:r>
-              <a:rPr lang="nb-NO" sz="1200" dirty="0">
-                <a:solidFill>
-                  <a:schemeClr val="tx1"/>
-                </a:solidFill>
-                <a:latin typeface="Agave" panose="020B0509040604020203" pitchFamily="49" charset="0"/>
-              </a:rPr>
-              <a:t> </a:t>
-            </a:r>
-            <a:r>
-              <a:rPr lang="nb-NO" sz="1200" dirty="0" err="1">
-                <a:solidFill>
-                  <a:schemeClr val="tx1"/>
-                </a:solidFill>
-                <a:latin typeface="Agave" panose="020B0509040604020203" pitchFamily="49" charset="0"/>
-              </a:rPr>
-              <a:t>reactor</a:t>
-            </a:r>
-            <a:r>
-              <a:rPr lang="nb-NO" sz="1200" dirty="0">
-                <a:solidFill>
-                  <a:schemeClr val="tx1"/>
-                </a:solidFill>
-                <a:latin typeface="Agave" panose="020B0509040604020203" pitchFamily="49" charset="0"/>
-              </a:rPr>
-              <a:t> </a:t>
-            </a:r>
-            <a:r>
-              <a:rPr lang="nb-NO" sz="1200" dirty="0" err="1">
-                <a:solidFill>
-                  <a:schemeClr val="tx1"/>
-                </a:solidFill>
-                <a:latin typeface="Agave" panose="020B0509040604020203" pitchFamily="49" charset="0"/>
-              </a:rPr>
-              <a:t>only</a:t>
-            </a:r>
-            <a:r>
-              <a:rPr lang="nb-NO" sz="1200" dirty="0">
-                <a:solidFill>
-                  <a:schemeClr val="tx1"/>
-                </a:solidFill>
-                <a:latin typeface="Agave" panose="020B0509040604020203" pitchFamily="49" charset="0"/>
-              </a:rPr>
-              <a:t> </a:t>
-            </a:r>
-            <a:r>
-              <a:rPr lang="nb-NO" sz="1200" dirty="0" err="1">
-                <a:solidFill>
-                  <a:schemeClr val="tx1"/>
-                </a:solidFill>
-                <a:latin typeface="Agave" panose="020B0509040604020203" pitchFamily="49" charset="0"/>
-              </a:rPr>
-              <a:t>needs</a:t>
-            </a:r>
-            <a:r>
-              <a:rPr lang="nb-NO" sz="1200" dirty="0">
-                <a:solidFill>
-                  <a:schemeClr val="tx1"/>
-                </a:solidFill>
-                <a:latin typeface="Agave" panose="020B0509040604020203" pitchFamily="49" charset="0"/>
-              </a:rPr>
-              <a:t> to </a:t>
-            </a:r>
-            <a:r>
-              <a:rPr lang="nb-NO" sz="1200" dirty="0" err="1">
-                <a:solidFill>
-                  <a:schemeClr val="tx1"/>
-                </a:solidFill>
-                <a:latin typeface="Agave" panose="020B0509040604020203" pitchFamily="49" charset="0"/>
-              </a:rPr>
-              <a:t>know</a:t>
-            </a:r>
-            <a:r>
-              <a:rPr lang="nb-NO" sz="1200" dirty="0">
-                <a:solidFill>
-                  <a:schemeClr val="tx1"/>
-                </a:solidFill>
-                <a:latin typeface="Agave" panose="020B0509040604020203" pitchFamily="49" charset="0"/>
-              </a:rPr>
-              <a:t> </a:t>
-            </a:r>
-            <a:r>
-              <a:rPr lang="nb-NO" sz="1200" dirty="0" err="1">
-                <a:solidFill>
-                  <a:schemeClr val="tx1"/>
-                </a:solidFill>
-                <a:latin typeface="Agave" panose="020B0509040604020203" pitchFamily="49" charset="0"/>
-              </a:rPr>
-              <a:t>how</a:t>
-            </a:r>
-            <a:r>
-              <a:rPr lang="nb-NO" sz="1200" dirty="0">
-                <a:solidFill>
-                  <a:schemeClr val="tx1"/>
-                </a:solidFill>
-                <a:latin typeface="Agave" panose="020B0509040604020203" pitchFamily="49" charset="0"/>
-              </a:rPr>
-              <a:t> to </a:t>
-            </a:r>
-            <a:r>
-              <a:rPr lang="nb-NO" sz="1200" dirty="0" err="1">
-                <a:solidFill>
-                  <a:schemeClr val="tx1"/>
-                </a:solidFill>
-                <a:latin typeface="Agave" panose="020B0509040604020203" pitchFamily="49" charset="0"/>
-              </a:rPr>
-              <a:t>call</a:t>
-            </a:r>
-            <a:r>
-              <a:rPr lang="nb-NO" sz="1200" dirty="0">
-                <a:solidFill>
-                  <a:schemeClr val="tx1"/>
-                </a:solidFill>
-                <a:latin typeface="Agave" panose="020B0509040604020203" pitchFamily="49" charset="0"/>
-              </a:rPr>
-              <a:t> «</a:t>
-            </a:r>
-            <a:r>
-              <a:rPr lang="nb-NO" sz="1200" dirty="0" err="1">
-                <a:solidFill>
-                  <a:schemeClr val="tx1"/>
-                </a:solidFill>
-                <a:latin typeface="Agave" panose="020B0509040604020203" pitchFamily="49" charset="0"/>
-              </a:rPr>
-              <a:t>Waker</a:t>
-            </a:r>
-            <a:r>
-              <a:rPr lang="nb-NO" sz="1200" dirty="0">
-                <a:solidFill>
-                  <a:schemeClr val="tx1"/>
-                </a:solidFill>
-                <a:latin typeface="Agave" panose="020B0509040604020203" pitchFamily="49" charset="0"/>
-              </a:rPr>
-              <a:t>::</a:t>
-            </a:r>
-            <a:r>
-              <a:rPr lang="nb-NO" sz="1200" dirty="0" err="1">
-                <a:solidFill>
-                  <a:schemeClr val="tx1"/>
-                </a:solidFill>
-                <a:latin typeface="Agave" panose="020B0509040604020203" pitchFamily="49" charset="0"/>
-              </a:rPr>
-              <a:t>wake</a:t>
-            </a:r>
-            <a:r>
-              <a:rPr lang="nb-NO" sz="1200" dirty="0">
-                <a:solidFill>
-                  <a:schemeClr val="tx1"/>
-                </a:solidFill>
-                <a:latin typeface="Agave" panose="020B0509040604020203" pitchFamily="49" charset="0"/>
-              </a:rPr>
-              <a:t>» </a:t>
-            </a:r>
-            <a:r>
-              <a:rPr lang="nb-NO" sz="1200" dirty="0" err="1">
-                <a:solidFill>
-                  <a:schemeClr val="tx1"/>
-                </a:solidFill>
-                <a:latin typeface="Agave" panose="020B0509040604020203" pitchFamily="49" charset="0"/>
-              </a:rPr>
-              <a:t>on</a:t>
-            </a:r>
-            <a:r>
-              <a:rPr lang="nb-NO" sz="1200" dirty="0">
-                <a:solidFill>
-                  <a:schemeClr val="tx1"/>
-                </a:solidFill>
-                <a:latin typeface="Agave" panose="020B0509040604020203" pitchFamily="49" charset="0"/>
-              </a:rPr>
-              <a:t> it.</a:t>
+              <a:t> `poll` </a:t>
+            </a:r>
+            <a:r>
+              <a:rPr lang="nb-NO" sz="1200" dirty="0" err="1">
+                <a:solidFill>
+                  <a:schemeClr val="tx1"/>
+                </a:solidFill>
+                <a:latin typeface="Agave" panose="020B0509040604020203" pitchFamily="49" charset="0"/>
+              </a:rPr>
+              <a:t>method</a:t>
+            </a:r>
+            <a:r>
+              <a:rPr lang="nb-NO" sz="1200" dirty="0">
+                <a:solidFill>
+                  <a:schemeClr val="tx1"/>
+                </a:solidFill>
+                <a:latin typeface="Agave" panose="020B0509040604020203" pitchFamily="49" charset="0"/>
+              </a:rPr>
+              <a:t>.</a:t>
             </a:r>
           </a:p>
         </p:txBody>
@@ -27466,6 +27782,471 @@
           </a:fontRef>
         </p:style>
       </p:cxnSp>
+      <p:sp>
+        <p:nvSpPr>
+          <p:cNvPr id="23" name="Snakkeboble: rektangel 20">
+            <a:extLst>
+              <a:ext uri="{FF2B5EF4-FFF2-40B4-BE49-F238E27FC236}">
+                <a16:creationId xmlns:a16="http://schemas.microsoft.com/office/drawing/2014/main" id="{0D851FBD-E827-436D-857F-0DB654750D44}"/>
+              </a:ext>
+            </a:extLst>
+          </p:cNvPr>
+          <p:cNvSpPr/>
+          <p:nvPr/>
+        </p:nvSpPr>
+        <p:spPr>
+          <a:xfrm>
+            <a:off x="5579000" y="2345674"/>
+            <a:ext cx="2265390" cy="1694289"/>
+          </a:xfrm>
+          <a:prstGeom prst="wedgeRectCallout">
+            <a:avLst>
+              <a:gd name="adj1" fmla="val 56945"/>
+              <a:gd name="adj2" fmla="val -20833"/>
+            </a:avLst>
+          </a:prstGeom>
+          <a:solidFill>
+            <a:srgbClr val="FFE79B"/>
+          </a:solidFill>
+        </p:spPr>
+        <p:style>
+          <a:lnRef idx="3">
+            <a:schemeClr val="lt1"/>
+          </a:lnRef>
+          <a:fillRef idx="1">
+            <a:schemeClr val="accent4"/>
+          </a:fillRef>
+          <a:effectRef idx="1">
+            <a:schemeClr val="accent4"/>
+          </a:effectRef>
+          <a:fontRef idx="minor">
+            <a:schemeClr val="lt1"/>
+          </a:fontRef>
+        </p:style>
+        <p:txBody>
+          <a:bodyPr rtlCol="0" anchor="t"/>
+          <a:lstStyle/>
+          <a:p>
+            <a:pPr algn="ctr"/>
+            <a:r>
+              <a:rPr lang="nb-NO" dirty="0">
+                <a:solidFill>
+                  <a:schemeClr val="tx1"/>
+                </a:solidFill>
+                <a:latin typeface="Agave" panose="020B0509040604020203" pitchFamily="49" charset="0"/>
+              </a:rPr>
+              <a:t>WAKER:</a:t>
+            </a:r>
+          </a:p>
+          <a:p>
+            <a:r>
+              <a:rPr lang="nb-NO" sz="1200" dirty="0">
+                <a:solidFill>
+                  <a:schemeClr val="tx1"/>
+                </a:solidFill>
+                <a:latin typeface="Agave" panose="020B0509040604020203" pitchFamily="49" charset="0"/>
+              </a:rPr>
+              <a:t>A </a:t>
+            </a:r>
+            <a:r>
+              <a:rPr lang="nb-NO" sz="1200" dirty="0" err="1">
+                <a:solidFill>
+                  <a:schemeClr val="tx1"/>
+                </a:solidFill>
+                <a:latin typeface="Agave" panose="020B0509040604020203" pitchFamily="49" charset="0"/>
+              </a:rPr>
+              <a:t>waker</a:t>
+            </a:r>
+            <a:r>
+              <a:rPr lang="nb-NO" sz="1200" dirty="0">
+                <a:solidFill>
+                  <a:schemeClr val="tx1"/>
+                </a:solidFill>
+                <a:latin typeface="Agave" panose="020B0509040604020203" pitchFamily="49" charset="0"/>
+              </a:rPr>
+              <a:t> is </a:t>
+            </a:r>
+            <a:r>
+              <a:rPr lang="nb-NO" sz="1200" dirty="0" err="1">
+                <a:solidFill>
+                  <a:schemeClr val="tx1"/>
+                </a:solidFill>
+                <a:latin typeface="Agave" panose="020B0509040604020203" pitchFamily="49" charset="0"/>
+              </a:rPr>
+              <a:t>passed</a:t>
+            </a:r>
+            <a:r>
+              <a:rPr lang="nb-NO" sz="1200" dirty="0">
+                <a:solidFill>
+                  <a:schemeClr val="tx1"/>
+                </a:solidFill>
+                <a:latin typeface="Agave" panose="020B0509040604020203" pitchFamily="49" charset="0"/>
+              </a:rPr>
+              <a:t> </a:t>
+            </a:r>
+            <a:r>
+              <a:rPr lang="nb-NO" sz="1200" dirty="0" err="1">
+                <a:solidFill>
+                  <a:schemeClr val="tx1"/>
+                </a:solidFill>
+                <a:latin typeface="Agave" panose="020B0509040604020203" pitchFamily="49" charset="0"/>
+              </a:rPr>
+              <a:t>on</a:t>
+            </a:r>
+            <a:r>
+              <a:rPr lang="nb-NO" sz="1200" dirty="0">
+                <a:solidFill>
+                  <a:schemeClr val="tx1"/>
+                </a:solidFill>
+                <a:latin typeface="Agave" panose="020B0509040604020203" pitchFamily="49" charset="0"/>
+              </a:rPr>
+              <a:t> from </a:t>
+            </a:r>
+            <a:r>
+              <a:rPr lang="nb-NO" sz="1200" dirty="0" err="1">
+                <a:solidFill>
+                  <a:schemeClr val="tx1"/>
+                </a:solidFill>
+                <a:latin typeface="Agave" panose="020B0509040604020203" pitchFamily="49" charset="0"/>
+              </a:rPr>
+              <a:t>the</a:t>
+            </a:r>
+            <a:r>
+              <a:rPr lang="nb-NO" sz="1200" dirty="0">
+                <a:solidFill>
+                  <a:schemeClr val="tx1"/>
+                </a:solidFill>
+                <a:latin typeface="Agave" panose="020B0509040604020203" pitchFamily="49" charset="0"/>
+              </a:rPr>
+              <a:t> </a:t>
+            </a:r>
+            <a:r>
+              <a:rPr lang="nb-NO" sz="1200" dirty="0" err="1">
+                <a:solidFill>
+                  <a:schemeClr val="tx1"/>
+                </a:solidFill>
+                <a:latin typeface="Agave" panose="020B0509040604020203" pitchFamily="49" charset="0"/>
+              </a:rPr>
+              <a:t>executor</a:t>
+            </a:r>
+            <a:r>
+              <a:rPr lang="nb-NO" sz="1200" dirty="0">
+                <a:solidFill>
+                  <a:schemeClr val="tx1"/>
+                </a:solidFill>
+                <a:latin typeface="Agave" panose="020B0509040604020203" pitchFamily="49" charset="0"/>
+              </a:rPr>
+              <a:t> to </a:t>
+            </a:r>
+            <a:r>
+              <a:rPr lang="nb-NO" sz="1200" dirty="0" err="1">
+                <a:solidFill>
+                  <a:schemeClr val="tx1"/>
+                </a:solidFill>
+                <a:latin typeface="Agave" panose="020B0509040604020203" pitchFamily="49" charset="0"/>
+              </a:rPr>
+              <a:t>the</a:t>
+            </a:r>
+            <a:r>
+              <a:rPr lang="nb-NO" sz="1200" dirty="0">
+                <a:solidFill>
+                  <a:schemeClr val="tx1"/>
+                </a:solidFill>
+                <a:latin typeface="Agave" panose="020B0509040604020203" pitchFamily="49" charset="0"/>
+              </a:rPr>
+              <a:t> </a:t>
+            </a:r>
+            <a:r>
+              <a:rPr lang="nb-NO" sz="1200" dirty="0" err="1">
+                <a:solidFill>
+                  <a:schemeClr val="tx1"/>
+                </a:solidFill>
+                <a:latin typeface="Agave" panose="020B0509040604020203" pitchFamily="49" charset="0"/>
+              </a:rPr>
+              <a:t>reactor</a:t>
+            </a:r>
+            <a:r>
+              <a:rPr lang="nb-NO" sz="1200" dirty="0">
+                <a:solidFill>
+                  <a:schemeClr val="tx1"/>
+                </a:solidFill>
+                <a:latin typeface="Agave" panose="020B0509040604020203" pitchFamily="49" charset="0"/>
+              </a:rPr>
+              <a:t>. The </a:t>
+            </a:r>
+            <a:r>
+              <a:rPr lang="nb-NO" sz="1200" dirty="0" err="1">
+                <a:solidFill>
+                  <a:schemeClr val="tx1"/>
+                </a:solidFill>
+                <a:latin typeface="Agave" panose="020B0509040604020203" pitchFamily="49" charset="0"/>
+              </a:rPr>
+              <a:t>waker</a:t>
+            </a:r>
+            <a:r>
+              <a:rPr lang="nb-NO" sz="1200" dirty="0">
+                <a:solidFill>
+                  <a:schemeClr val="tx1"/>
+                </a:solidFill>
+                <a:latin typeface="Agave" panose="020B0509040604020203" pitchFamily="49" charset="0"/>
+              </a:rPr>
+              <a:t> is </a:t>
+            </a:r>
+            <a:r>
+              <a:rPr lang="nb-NO" sz="1200" dirty="0" err="1">
+                <a:solidFill>
+                  <a:schemeClr val="tx1"/>
+                </a:solidFill>
+                <a:latin typeface="Agave" panose="020B0509040604020203" pitchFamily="49" charset="0"/>
+              </a:rPr>
+              <a:t>spesific</a:t>
+            </a:r>
+            <a:r>
+              <a:rPr lang="nb-NO" sz="1200" dirty="0">
+                <a:solidFill>
+                  <a:schemeClr val="tx1"/>
+                </a:solidFill>
+                <a:latin typeface="Agave" panose="020B0509040604020203" pitchFamily="49" charset="0"/>
+              </a:rPr>
+              <a:t> for </a:t>
+            </a:r>
+            <a:r>
+              <a:rPr lang="nb-NO" sz="1200" dirty="0" err="1">
+                <a:solidFill>
+                  <a:schemeClr val="tx1"/>
+                </a:solidFill>
+                <a:latin typeface="Agave" panose="020B0509040604020203" pitchFamily="49" charset="0"/>
+              </a:rPr>
+              <a:t>the</a:t>
+            </a:r>
+            <a:r>
+              <a:rPr lang="nb-NO" sz="1200" dirty="0">
+                <a:solidFill>
+                  <a:schemeClr val="tx1"/>
+                </a:solidFill>
+                <a:latin typeface="Agave" panose="020B0509040604020203" pitchFamily="49" charset="0"/>
+              </a:rPr>
+              <a:t> </a:t>
+            </a:r>
+            <a:r>
+              <a:rPr lang="nb-NO" sz="1200" dirty="0" err="1">
+                <a:solidFill>
+                  <a:schemeClr val="tx1"/>
+                </a:solidFill>
+                <a:latin typeface="Agave" panose="020B0509040604020203" pitchFamily="49" charset="0"/>
+              </a:rPr>
+              <a:t>Executor</a:t>
+            </a:r>
+            <a:r>
+              <a:rPr lang="nb-NO" sz="1200" dirty="0">
+                <a:solidFill>
+                  <a:schemeClr val="tx1"/>
+                </a:solidFill>
+                <a:latin typeface="Agave" panose="020B0509040604020203" pitchFamily="49" charset="0"/>
+              </a:rPr>
+              <a:t>, </a:t>
+            </a:r>
+            <a:r>
+              <a:rPr lang="nb-NO" sz="1200" dirty="0" err="1">
+                <a:solidFill>
+                  <a:schemeClr val="tx1"/>
+                </a:solidFill>
+                <a:latin typeface="Agave" panose="020B0509040604020203" pitchFamily="49" charset="0"/>
+              </a:rPr>
+              <a:t>but</a:t>
+            </a:r>
+            <a:r>
+              <a:rPr lang="nb-NO" sz="1200" dirty="0">
+                <a:solidFill>
+                  <a:schemeClr val="tx1"/>
+                </a:solidFill>
+                <a:latin typeface="Agave" panose="020B0509040604020203" pitchFamily="49" charset="0"/>
+              </a:rPr>
+              <a:t> </a:t>
+            </a:r>
+            <a:r>
+              <a:rPr lang="nb-NO" sz="1200" dirty="0" err="1">
+                <a:solidFill>
+                  <a:schemeClr val="tx1"/>
+                </a:solidFill>
+                <a:latin typeface="Agave" panose="020B0509040604020203" pitchFamily="49" charset="0"/>
+              </a:rPr>
+              <a:t>the</a:t>
+            </a:r>
+            <a:r>
+              <a:rPr lang="nb-NO" sz="1200" dirty="0">
+                <a:solidFill>
+                  <a:schemeClr val="tx1"/>
+                </a:solidFill>
+                <a:latin typeface="Agave" panose="020B0509040604020203" pitchFamily="49" charset="0"/>
+              </a:rPr>
+              <a:t> </a:t>
+            </a:r>
+            <a:r>
+              <a:rPr lang="nb-NO" sz="1200" dirty="0" err="1">
+                <a:solidFill>
+                  <a:schemeClr val="tx1"/>
+                </a:solidFill>
+                <a:latin typeface="Agave" panose="020B0509040604020203" pitchFamily="49" charset="0"/>
+              </a:rPr>
+              <a:t>reactor</a:t>
+            </a:r>
+            <a:r>
+              <a:rPr lang="nb-NO" sz="1200" dirty="0">
+                <a:solidFill>
+                  <a:schemeClr val="tx1"/>
+                </a:solidFill>
+                <a:latin typeface="Agave" panose="020B0509040604020203" pitchFamily="49" charset="0"/>
+              </a:rPr>
+              <a:t> </a:t>
+            </a:r>
+            <a:r>
+              <a:rPr lang="nb-NO" sz="1200" dirty="0" err="1">
+                <a:solidFill>
+                  <a:schemeClr val="tx1"/>
+                </a:solidFill>
+                <a:latin typeface="Agave" panose="020B0509040604020203" pitchFamily="49" charset="0"/>
+              </a:rPr>
+              <a:t>only</a:t>
+            </a:r>
+            <a:r>
+              <a:rPr lang="nb-NO" sz="1200" dirty="0">
+                <a:solidFill>
+                  <a:schemeClr val="tx1"/>
+                </a:solidFill>
+                <a:latin typeface="Agave" panose="020B0509040604020203" pitchFamily="49" charset="0"/>
+              </a:rPr>
+              <a:t> </a:t>
+            </a:r>
+            <a:r>
+              <a:rPr lang="nb-NO" sz="1200" dirty="0" err="1">
+                <a:solidFill>
+                  <a:schemeClr val="tx1"/>
+                </a:solidFill>
+                <a:latin typeface="Agave" panose="020B0509040604020203" pitchFamily="49" charset="0"/>
+              </a:rPr>
+              <a:t>needs</a:t>
+            </a:r>
+            <a:r>
+              <a:rPr lang="nb-NO" sz="1200" dirty="0">
+                <a:solidFill>
+                  <a:schemeClr val="tx1"/>
+                </a:solidFill>
+                <a:latin typeface="Agave" panose="020B0509040604020203" pitchFamily="49" charset="0"/>
+              </a:rPr>
+              <a:t> to </a:t>
+            </a:r>
+            <a:r>
+              <a:rPr lang="nb-NO" sz="1200" dirty="0" err="1">
+                <a:solidFill>
+                  <a:schemeClr val="tx1"/>
+                </a:solidFill>
+                <a:latin typeface="Agave" panose="020B0509040604020203" pitchFamily="49" charset="0"/>
+              </a:rPr>
+              <a:t>know</a:t>
+            </a:r>
+            <a:r>
+              <a:rPr lang="nb-NO" sz="1200" dirty="0">
+                <a:solidFill>
+                  <a:schemeClr val="tx1"/>
+                </a:solidFill>
+                <a:latin typeface="Agave" panose="020B0509040604020203" pitchFamily="49" charset="0"/>
+              </a:rPr>
+              <a:t> </a:t>
+            </a:r>
+            <a:r>
+              <a:rPr lang="nb-NO" sz="1200" dirty="0" err="1">
+                <a:solidFill>
+                  <a:schemeClr val="tx1"/>
+                </a:solidFill>
+                <a:latin typeface="Agave" panose="020B0509040604020203" pitchFamily="49" charset="0"/>
+              </a:rPr>
+              <a:t>how</a:t>
+            </a:r>
+            <a:r>
+              <a:rPr lang="nb-NO" sz="1200" dirty="0">
+                <a:solidFill>
+                  <a:schemeClr val="tx1"/>
+                </a:solidFill>
+                <a:latin typeface="Agave" panose="020B0509040604020203" pitchFamily="49" charset="0"/>
+              </a:rPr>
+              <a:t> to </a:t>
+            </a:r>
+            <a:r>
+              <a:rPr lang="nb-NO" sz="1200" dirty="0" err="1">
+                <a:solidFill>
+                  <a:schemeClr val="tx1"/>
+                </a:solidFill>
+                <a:latin typeface="Agave" panose="020B0509040604020203" pitchFamily="49" charset="0"/>
+              </a:rPr>
+              <a:t>call</a:t>
+            </a:r>
+            <a:r>
+              <a:rPr lang="nb-NO" sz="1200" dirty="0">
+                <a:solidFill>
+                  <a:schemeClr val="tx1"/>
+                </a:solidFill>
+                <a:latin typeface="Agave" panose="020B0509040604020203" pitchFamily="49" charset="0"/>
+              </a:rPr>
+              <a:t> «</a:t>
+            </a:r>
+            <a:r>
+              <a:rPr lang="nb-NO" sz="1200" dirty="0" err="1">
+                <a:solidFill>
+                  <a:schemeClr val="tx1"/>
+                </a:solidFill>
+                <a:latin typeface="Agave" panose="020B0509040604020203" pitchFamily="49" charset="0"/>
+              </a:rPr>
+              <a:t>Waker</a:t>
+            </a:r>
+            <a:r>
+              <a:rPr lang="nb-NO" sz="1200" dirty="0">
+                <a:solidFill>
+                  <a:schemeClr val="tx1"/>
+                </a:solidFill>
+                <a:latin typeface="Agave" panose="020B0509040604020203" pitchFamily="49" charset="0"/>
+              </a:rPr>
+              <a:t>::</a:t>
+            </a:r>
+            <a:r>
+              <a:rPr lang="nb-NO" sz="1200" dirty="0" err="1">
+                <a:solidFill>
+                  <a:schemeClr val="tx1"/>
+                </a:solidFill>
+                <a:latin typeface="Agave" panose="020B0509040604020203" pitchFamily="49" charset="0"/>
+              </a:rPr>
+              <a:t>wake</a:t>
+            </a:r>
+            <a:r>
+              <a:rPr lang="nb-NO" sz="1200" dirty="0">
+                <a:solidFill>
+                  <a:schemeClr val="tx1"/>
+                </a:solidFill>
+                <a:latin typeface="Agave" panose="020B0509040604020203" pitchFamily="49" charset="0"/>
+              </a:rPr>
+              <a:t>» </a:t>
+            </a:r>
+            <a:r>
+              <a:rPr lang="nb-NO" sz="1200" dirty="0" err="1">
+                <a:solidFill>
+                  <a:schemeClr val="tx1"/>
+                </a:solidFill>
+                <a:latin typeface="Agave" panose="020B0509040604020203" pitchFamily="49" charset="0"/>
+              </a:rPr>
+              <a:t>on</a:t>
+            </a:r>
+            <a:r>
+              <a:rPr lang="nb-NO" sz="1200" dirty="0">
+                <a:solidFill>
+                  <a:schemeClr val="tx1"/>
+                </a:solidFill>
+                <a:latin typeface="Agave" panose="020B0509040604020203" pitchFamily="49" charset="0"/>
+              </a:rPr>
+              <a:t> it.</a:t>
+            </a:r>
+          </a:p>
+        </p:txBody>
+      </p:sp>
     </p:spTree>
     <p:extLst>
       <p:ext uri="{BB962C8B-B14F-4D97-AF65-F5344CB8AC3E}">

</xml_diff>

<commit_message>
fix slide 15 (wrong numbering)
</commit_message>
<xml_diff>
--- a/resources/futures_animation.pptx
+++ b/resources/futures_animation.pptx
@@ -20413,7 +20413,7 @@
                   </a:outerShdw>
                 </a:effectLst>
               </a:rPr>
-              <a:t>15</a:t>
+              <a:t>16</a:t>
             </a:r>
           </a:p>
         </p:txBody>
@@ -22539,7 +22539,7 @@
                   </a:outerShdw>
                 </a:effectLst>
               </a:rPr>
-              <a:t>16</a:t>
+              <a:t>17</a:t>
             </a:r>
           </a:p>
         </p:txBody>
@@ -25033,7 +25033,7 @@
                   </a:outerShdw>
                 </a:effectLst>
               </a:rPr>
-              <a:t>17</a:t>
+              <a:t>18</a:t>
             </a:r>
           </a:p>
         </p:txBody>

</xml_diff>

<commit_message>
improved text in slide 11
</commit_message>
<xml_diff>
--- a/resources/futures_animation.pptx
+++ b/resources/futures_animation.pptx
@@ -806,7 +806,7 @@
           <a:p>
             <a:fld id="{BC0B83D0-7A17-457C-BEE4-CE4EA4B20CAB}" type="datetimeFigureOut">
               <a:rPr lang="nb-NO" smtClean="0"/>
-              <a:t>26.12.2020</a:t>
+              <a:t>27.12.2020</a:t>
             </a:fld>
             <a:endParaRPr lang="nb-NO"/>
           </a:p>
@@ -1004,7 +1004,7 @@
           <a:p>
             <a:fld id="{BC0B83D0-7A17-457C-BEE4-CE4EA4B20CAB}" type="datetimeFigureOut">
               <a:rPr lang="nb-NO" smtClean="0"/>
-              <a:t>26.12.2020</a:t>
+              <a:t>27.12.2020</a:t>
             </a:fld>
             <a:endParaRPr lang="nb-NO"/>
           </a:p>
@@ -1212,7 +1212,7 @@
           <a:p>
             <a:fld id="{BC0B83D0-7A17-457C-BEE4-CE4EA4B20CAB}" type="datetimeFigureOut">
               <a:rPr lang="nb-NO" smtClean="0"/>
-              <a:t>26.12.2020</a:t>
+              <a:t>27.12.2020</a:t>
             </a:fld>
             <a:endParaRPr lang="nb-NO"/>
           </a:p>
@@ -1410,7 +1410,7 @@
           <a:p>
             <a:fld id="{BC0B83D0-7A17-457C-BEE4-CE4EA4B20CAB}" type="datetimeFigureOut">
               <a:rPr lang="nb-NO" smtClean="0"/>
-              <a:t>26.12.2020</a:t>
+              <a:t>27.12.2020</a:t>
             </a:fld>
             <a:endParaRPr lang="nb-NO"/>
           </a:p>
@@ -1685,7 +1685,7 @@
           <a:p>
             <a:fld id="{BC0B83D0-7A17-457C-BEE4-CE4EA4B20CAB}" type="datetimeFigureOut">
               <a:rPr lang="nb-NO" smtClean="0"/>
-              <a:t>26.12.2020</a:t>
+              <a:t>27.12.2020</a:t>
             </a:fld>
             <a:endParaRPr lang="nb-NO"/>
           </a:p>
@@ -1950,7 +1950,7 @@
           <a:p>
             <a:fld id="{BC0B83D0-7A17-457C-BEE4-CE4EA4B20CAB}" type="datetimeFigureOut">
               <a:rPr lang="nb-NO" smtClean="0"/>
-              <a:t>26.12.2020</a:t>
+              <a:t>27.12.2020</a:t>
             </a:fld>
             <a:endParaRPr lang="nb-NO"/>
           </a:p>
@@ -2362,7 +2362,7 @@
           <a:p>
             <a:fld id="{BC0B83D0-7A17-457C-BEE4-CE4EA4B20CAB}" type="datetimeFigureOut">
               <a:rPr lang="nb-NO" smtClean="0"/>
-              <a:t>26.12.2020</a:t>
+              <a:t>27.12.2020</a:t>
             </a:fld>
             <a:endParaRPr lang="nb-NO"/>
           </a:p>
@@ -2503,7 +2503,7 @@
           <a:p>
             <a:fld id="{BC0B83D0-7A17-457C-BEE4-CE4EA4B20CAB}" type="datetimeFigureOut">
               <a:rPr lang="nb-NO" smtClean="0"/>
-              <a:t>26.12.2020</a:t>
+              <a:t>27.12.2020</a:t>
             </a:fld>
             <a:endParaRPr lang="nb-NO"/>
           </a:p>
@@ -2616,7 +2616,7 @@
           <a:p>
             <a:fld id="{BC0B83D0-7A17-457C-BEE4-CE4EA4B20CAB}" type="datetimeFigureOut">
               <a:rPr lang="nb-NO" smtClean="0"/>
-              <a:t>26.12.2020</a:t>
+              <a:t>27.12.2020</a:t>
             </a:fld>
             <a:endParaRPr lang="nb-NO"/>
           </a:p>
@@ -2927,7 +2927,7 @@
           <a:p>
             <a:fld id="{BC0B83D0-7A17-457C-BEE4-CE4EA4B20CAB}" type="datetimeFigureOut">
               <a:rPr lang="nb-NO" smtClean="0"/>
-              <a:t>26.12.2020</a:t>
+              <a:t>27.12.2020</a:t>
             </a:fld>
             <a:endParaRPr lang="nb-NO"/>
           </a:p>
@@ -3215,7 +3215,7 @@
           <a:p>
             <a:fld id="{BC0B83D0-7A17-457C-BEE4-CE4EA4B20CAB}" type="datetimeFigureOut">
               <a:rPr lang="nb-NO" smtClean="0"/>
-              <a:t>26.12.2020</a:t>
+              <a:t>27.12.2020</a:t>
             </a:fld>
             <a:endParaRPr lang="nb-NO"/>
           </a:p>
@@ -3456,7 +3456,7 @@
           <a:p>
             <a:fld id="{BC0B83D0-7A17-457C-BEE4-CE4EA4B20CAB}" type="datetimeFigureOut">
               <a:rPr lang="nb-NO" smtClean="0"/>
-              <a:t>26.12.2020</a:t>
+              <a:t>27.12.2020</a:t>
             </a:fld>
             <a:endParaRPr lang="nb-NO"/>
           </a:p>
@@ -8804,7 +8804,7 @@
                 </a:solidFill>
                 <a:latin typeface="Consolas" panose="020B0609020204030204" pitchFamily="49" charset="0"/>
               </a:rPr>
-              <a:t>If we want two futures to run concurrently, we need to create another top-level future.</a:t>
+              <a:t>If we want two futures to run concurrently, we need to create another top-level future. A top-level future is often called a “task”.</a:t>
             </a:r>
           </a:p>
           <a:p>
@@ -8823,7 +8823,7 @@
                 </a:solidFill>
                 <a:latin typeface="Consolas" panose="020B0609020204030204" pitchFamily="49" charset="0"/>
               </a:rPr>
-              <a:t>Executors often provide a method to create a new top-level future (often called “spawn”).</a:t>
+              <a:t>Most Executors provide a method to “spawn” a new top-level future.</a:t>
             </a:r>
           </a:p>
           <a:p>

</xml_diff>